<commit_message>
PNG of state machine
</commit_message>
<xml_diff>
--- a/Doc/VisionAlignStateMachine.pptx
+++ b/Doc/VisionAlignStateMachine.pptx
@@ -6,7 +6,6 @@
   </p:sldMasterIdLst>
   <p:sldIdLst>
     <p:sldId id="257" r:id="rId2"/>
-    <p:sldId id="258" r:id="rId3"/>
   </p:sldIdLst>
   <p:sldSz cx="12192000" cy="6858000"/>
   <p:notesSz cx="6858000" cy="9144000"/>
@@ -105,6 +104,11 @@
       </a:defRPr>
     </a:lvl9pPr>
   </p:defaultTextStyle>
+  <p:extLst>
+    <p:ext uri="{EFAFB233-063F-42B5-8137-9DF3F51BA10A}">
+      <p15:sldGuideLst xmlns:p15="http://schemas.microsoft.com/office/powerpoint/2012/main"/>
+    </p:ext>
+  </p:extLst>
 </p:presentation>
 </file>
 
@@ -3804,74 +3808,6 @@
 </p:sld>
 </file>
 
-<file path=ppt/slides/slide2.xml><?xml version="1.0" encoding="utf-8"?>
-<p:sld xmlns:a="http://schemas.openxmlformats.org/drawingml/2006/main" xmlns:r="http://schemas.openxmlformats.org/officeDocument/2006/relationships" xmlns:p="http://schemas.openxmlformats.org/presentationml/2006/main">
-  <p:cSld>
-    <p:spTree>
-      <p:nvGrpSpPr>
-        <p:cNvPr id="1" name=""/>
-        <p:cNvGrpSpPr/>
-        <p:nvPr/>
-      </p:nvGrpSpPr>
-      <p:grpSpPr>
-        <a:xfrm>
-          <a:off x="0" y="0"/>
-          <a:ext cx="0" cy="0"/>
-          <a:chOff x="0" y="0"/>
-          <a:chExt cx="0" cy="0"/>
-        </a:xfrm>
-      </p:grpSpPr>
-      <p:sp>
-        <p:nvSpPr>
-          <p:cNvPr id="2" name="Title 1"/>
-          <p:cNvSpPr>
-            <a:spLocks noGrp="1"/>
-          </p:cNvSpPr>
-          <p:nvPr>
-            <p:ph type="title"/>
-          </p:nvPr>
-        </p:nvSpPr>
-        <p:spPr/>
-        <p:txBody>
-          <a:bodyPr/>
-          <a:lstStyle/>
-          <a:p>
-            <a:endParaRPr lang="en-US" dirty="0"/>
-          </a:p>
-        </p:txBody>
-      </p:sp>
-      <p:sp>
-        <p:nvSpPr>
-          <p:cNvPr id="3" name="Content Placeholder 2"/>
-          <p:cNvSpPr>
-            <a:spLocks noGrp="1"/>
-          </p:cNvSpPr>
-          <p:nvPr>
-            <p:ph idx="1"/>
-          </p:nvPr>
-        </p:nvSpPr>
-        <p:spPr/>
-        <p:txBody>
-          <a:bodyPr/>
-          <a:lstStyle/>
-          <a:p>
-            <a:endParaRPr lang="en-US" dirty="0"/>
-          </a:p>
-        </p:txBody>
-      </p:sp>
-    </p:spTree>
-    <p:extLst>
-      <p:ext uri="{BB962C8B-B14F-4D97-AF65-F5344CB8AC3E}">
-        <p14:creationId xmlns:p14="http://schemas.microsoft.com/office/powerpoint/2010/main" val="810835365"/>
-      </p:ext>
-    </p:extLst>
-  </p:cSld>
-  <p:clrMapOvr>
-    <a:masterClrMapping/>
-  </p:clrMapOvr>
-</p:sld>
-</file>
-
 <file path=ppt/theme/theme1.xml><?xml version="1.0" encoding="utf-8"?>
 <a:theme xmlns:a="http://schemas.openxmlformats.org/drawingml/2006/main" name="Office Theme">
   <a:themeElements>

</xml_diff>